<commit_message>
successfully converted my program into a launchable application simpy navigate into dist folder there u can find the launchable application.
</commit_message>
<xml_diff>
--- a/RECURSIVE FILE EXPLORER.pptx
+++ b/RECURSIVE FILE EXPLORER.pptx
@@ -7085,18 +7085,25 @@
               <a:buChar char="•"/>
             </a:pPr>
             <a:r>
-              <a:rPr lang="en-US" altLang="en-US" sz="4400" b="1" dirty="0" err="1">
-                <a:latin typeface="Poppins" panose="00000500000000000000" pitchFamily="2" charset="0"/>
-                <a:cs typeface="Poppins" panose="00000500000000000000" pitchFamily="2" charset="0"/>
-              </a:rPr>
-              <a:t>pIL</a:t>
-            </a:r>
-            <a:r>
               <a:rPr lang="en-US" altLang="en-US" sz="4400" b="1" dirty="0">
                 <a:latin typeface="Poppins" panose="00000500000000000000" pitchFamily="2" charset="0"/>
                 <a:cs typeface="Poppins" panose="00000500000000000000" pitchFamily="2" charset="0"/>
               </a:rPr>
-              <a:t> module (images display </a:t>
+              <a:t>P</a:t>
+            </a:r>
+            <a:r>
+              <a:rPr lang="en-US" altLang="en-US" sz="4400" b="1">
+                <a:latin typeface="Poppins" panose="00000500000000000000" pitchFamily="2" charset="0"/>
+                <a:cs typeface="Poppins" panose="00000500000000000000" pitchFamily="2" charset="0"/>
+              </a:rPr>
+              <a:t>IL </a:t>
+            </a:r>
+            <a:r>
+              <a:rPr lang="en-US" altLang="en-US" sz="4400" b="1" dirty="0">
+                <a:latin typeface="Poppins" panose="00000500000000000000" pitchFamily="2" charset="0"/>
+                <a:cs typeface="Poppins" panose="00000500000000000000" pitchFamily="2" charset="0"/>
+              </a:rPr>
+              <a:t>module (images display </a:t>
             </a:r>
             <a:r>
               <a:rPr lang="en-US" altLang="en-US" sz="4400" b="1" dirty="0" err="1">

</xml_diff>